<commit_message>
Added presentation materials to the repo
</commit_message>
<xml_diff>
--- a/presentation.pptx
+++ b/presentation.pptx
@@ -6556,7 +6556,7 @@
         </p:nvSpPr>
         <p:spPr>
           <a:xfrm>
-            <a:off x="2930475" y="2903016"/>
+            <a:off x="2917382" y="2772076"/>
             <a:ext cx="6136350" cy="2184130"/>
           </a:xfrm>
           <a:prstGeom prst="frame">
@@ -6617,7 +6617,7 @@
         </p:blipFill>
         <p:spPr>
           <a:xfrm>
-            <a:off x="2859916" y="2662433"/>
+            <a:off x="2846823" y="2662433"/>
             <a:ext cx="800931" cy="800931"/>
           </a:xfrm>
           <a:prstGeom prst="rect">
@@ -6641,7 +6641,7 @@
         </p:blipFill>
         <p:spPr>
           <a:xfrm>
-            <a:off x="3935342" y="3119418"/>
+            <a:off x="3922249" y="2988478"/>
             <a:ext cx="1086478" cy="1506382"/>
           </a:xfrm>
           <a:prstGeom prst="rect">
@@ -6657,7 +6657,7 @@
         </p:nvSpPr>
         <p:spPr>
           <a:xfrm>
-            <a:off x="3321009" y="4643438"/>
+            <a:off x="3307916" y="4512498"/>
             <a:ext cx="2425466" cy="369332"/>
           </a:xfrm>
           <a:prstGeom prst="rect">
@@ -6688,7 +6688,7 @@
         </p:nvGrpSpPr>
         <p:grpSpPr>
           <a:xfrm>
-            <a:off x="5802900" y="3118207"/>
+            <a:off x="5789807" y="2987267"/>
             <a:ext cx="3036882" cy="1746209"/>
             <a:chOff x="3642602" y="806062"/>
             <a:chExt cx="3036882" cy="1746209"/>
@@ -6780,7 +6780,7 @@
         </p:nvCxnSpPr>
         <p:spPr>
           <a:xfrm>
-            <a:off x="5021820" y="3941212"/>
+            <a:off x="5008727" y="3810272"/>
             <a:ext cx="781081" cy="0"/>
           </a:xfrm>
           <a:prstGeom prst="line">
@@ -6823,7 +6823,7 @@
         </p:blipFill>
         <p:spPr>
           <a:xfrm>
-            <a:off x="3268089" y="4036803"/>
+            <a:off x="3254996" y="3905863"/>
             <a:ext cx="537014" cy="553721"/>
           </a:xfrm>
           <a:prstGeom prst="rect">
@@ -6894,7 +6894,7 @@
         </p:blipFill>
         <p:spPr>
           <a:xfrm>
-            <a:off x="7755176" y="3106023"/>
+            <a:off x="7742083" y="2975083"/>
             <a:ext cx="999309" cy="629524"/>
           </a:xfrm>
           <a:prstGeom prst="rect">
@@ -6918,7 +6918,7 @@
         </p:blipFill>
         <p:spPr>
           <a:xfrm>
-            <a:off x="5850256" y="3163513"/>
+            <a:off x="5837163" y="3032573"/>
             <a:ext cx="1464098" cy="393477"/>
           </a:xfrm>
           <a:prstGeom prst="rect">

</xml_diff>